<commit_message>
Updates to several presentations
</commit_message>
<xml_diff>
--- a/presentations/09-reproducibility.pptx
+++ b/presentations/09-reproducibility.pptx
@@ -284,7 +284,7 @@
           <a:p>
             <a:fld id="{0B842F42-2CE9-4E35-95C1-410DC08A50B1}" type="datetimeFigureOut">
               <a:rPr lang="en-US" smtClean="0"/>
-              <a:t>7/25/2020</a:t>
+              <a:t>7/28/2020</a:t>
             </a:fld>
             <a:endParaRPr lang="en-US"/>
           </a:p>
@@ -449,7 +449,7 @@
           <a:p>
             <a:fld id="{6F282904-F315-4730-8D91-37D99E141A6F}" type="datetimeFigureOut">
               <a:rPr lang="en-US" smtClean="0"/>
-              <a:t>7/25/2020</a:t>
+              <a:t>7/28/2020</a:t>
             </a:fld>
             <a:endParaRPr lang="en-US"/>
           </a:p>
@@ -8981,26 +8981,20 @@
             <a:spLocks noGrp="1"/>
           </p:cNvSpPr>
           <p:nvPr>
-            <p:ph sz="quarter" idx="1"/>
+            <p:ph idx="1"/>
           </p:nvPr>
         </p:nvSpPr>
-        <p:spPr>
-          <a:xfrm>
-            <a:off x="2135060" y="1600199"/>
-            <a:ext cx="8086853" cy="4769490"/>
-          </a:xfrm>
-        </p:spPr>
+        <p:spPr/>
         <p:txBody>
           <a:bodyPr>
             <a:normAutofit/>
           </a:bodyPr>
           <a:lstStyle/>
           <a:p>
-            <a:pPr marL="0" indent="0">
+            <a:pPr>
               <a:spcBef>
-                <a:spcPts val="0"/>
+                <a:spcPts val="800"/>
               </a:spcBef>
-              <a:buNone/>
             </a:pPr>
             <a:r>
               <a:rPr lang="en-US" dirty="0"/>
@@ -9015,20 +9009,10 @@
             <a:endParaRPr lang="en-US" dirty="0"/>
           </a:p>
           <a:p>
-            <a:pPr marL="0" indent="0">
+            <a:pPr>
               <a:spcBef>
-                <a:spcPts val="0"/>
+                <a:spcPts val="800"/>
               </a:spcBef>
-              <a:buNone/>
-            </a:pPr>
-            <a:endParaRPr lang="en-US" dirty="0"/>
-          </a:p>
-          <a:p>
-            <a:pPr marL="0" indent="0">
-              <a:spcBef>
-                <a:spcPts val="0"/>
-              </a:spcBef>
-              <a:buNone/>
             </a:pPr>
             <a:r>
               <a:rPr lang="en-US" dirty="0"/>
@@ -9059,20 +9043,10 @@
             <a:endParaRPr lang="en-US" dirty="0"/>
           </a:p>
           <a:p>
-            <a:pPr marL="0" indent="0">
+            <a:pPr>
               <a:spcBef>
-                <a:spcPts val="0"/>
+                <a:spcPts val="800"/>
               </a:spcBef>
-              <a:buNone/>
-            </a:pPr>
-            <a:endParaRPr lang="en-US" dirty="0"/>
-          </a:p>
-          <a:p>
-            <a:pPr marL="0" indent="0">
-              <a:spcBef>
-                <a:spcPts val="0"/>
-              </a:spcBef>
-              <a:buNone/>
             </a:pPr>
             <a:r>
               <a:rPr lang="en-US" dirty="0"/>
@@ -9110,6 +9084,49 @@
               <a:rPr lang="en-US" dirty="0"/>
               <a:t> Science (09 Dec 2016), pp. 1240-1241</a:t>
             </a:r>
+          </a:p>
+          <a:p>
+            <a:pPr>
+              <a:spcBef>
+                <a:spcPts val="800"/>
+              </a:spcBef>
+            </a:pPr>
+            <a:r>
+              <a:rPr lang="en-US" dirty="0"/>
+              <a:t>Simple experiments in reproducibility and technical trust by Mike </a:t>
+            </a:r>
+            <a:r>
+              <a:rPr lang="en-US" dirty="0" err="1"/>
+              <a:t>Heroux</a:t>
+            </a:r>
+            <a:r>
+              <a:rPr lang="en-US" dirty="0"/>
+              <a:t> and students (work </a:t>
+            </a:r>
+            <a:r>
+              <a:rPr lang="en-US"/>
+              <a:t>in progress),</a:t>
+            </a:r>
+            <a:r>
+              <a:rPr lang="en-US">
+                <a:hlinkClick r:id="rId4"/>
+              </a:rPr>
+              <a:t> </a:t>
+            </a:r>
+            <a:r>
+              <a:rPr lang="en-US" u="sng" dirty="0">
+                <a:hlinkClick r:id="rId4"/>
+              </a:rPr>
+              <a:t>https://betterscientificsoftware.github.io/Trust-Tools/</a:t>
+            </a:r>
+            <a:endParaRPr lang="en-US" u="sng" dirty="0"/>
+          </a:p>
+          <a:p>
+            <a:pPr>
+              <a:spcBef>
+                <a:spcPts val="800"/>
+              </a:spcBef>
+            </a:pPr>
             <a:endParaRPr lang="en-US" sz="1600" dirty="0"/>
           </a:p>
         </p:txBody>
@@ -11558,12 +11575,6 @@
 </file>
 
 <file path=customXml/item1.xml><?xml version="1.0" encoding="utf-8"?>
-<p:properties xmlns:p="http://schemas.microsoft.com/office/2006/metadata/properties" xmlns:xsi="http://www.w3.org/2001/XMLSchema-instance" xmlns:pc="http://schemas.microsoft.com/office/infopath/2007/PartnerControls">
-  <documentManagement/>
-</p:properties>
-</file>
-
-<file path=customXml/item2.xml><?xml version="1.0" encoding="utf-8"?>
 <ct:contentTypeSchema xmlns:ct="http://schemas.microsoft.com/office/2006/metadata/contentType" xmlns:ma="http://schemas.microsoft.com/office/2006/metadata/properties/metaAttributes" ct:_="" ma:_="" ma:contentTypeName="Document" ma:contentTypeID="0x010100565464437F680748A68B85EB6594EA7D" ma:contentTypeVersion="0" ma:contentTypeDescription="Create a new document." ma:contentTypeScope="" ma:versionID="fe3f4dd58d5914c51cfc6deaa8ad845c">
   <xsd:schema xmlns:xsd="http://www.w3.org/2001/XMLSchema" xmlns:p="http://schemas.microsoft.com/office/2006/metadata/properties" targetNamespace="http://schemas.microsoft.com/office/2006/metadata/properties" ma:root="true" ma:fieldsID="4aeb20c0e3442673af7ee10786458764">
     <xsd:element name="properties">
@@ -11612,6 +11623,12 @@
 </ct:contentTypeSchema>
 </file>
 
+<file path=customXml/item2.xml><?xml version="1.0" encoding="utf-8"?>
+<p:properties xmlns:p="http://schemas.microsoft.com/office/2006/metadata/properties" xmlns:xsi="http://www.w3.org/2001/XMLSchema-instance" xmlns:pc="http://schemas.microsoft.com/office/infopath/2007/PartnerControls">
+  <documentManagement/>
+</p:properties>
+</file>
+
 <file path=customXml/item3.xml><?xml version="1.0" encoding="utf-8"?>
 <?mso-contentType ?>
 <FormTemplates xmlns="http://schemas.microsoft.com/sharepoint/v3/contenttype/forms">
@@ -11622,6 +11639,21 @@
 </file>
 
 <file path=customXml/itemProps1.xml><?xml version="1.0" encoding="utf-8"?>
+<ds:datastoreItem xmlns:ds="http://schemas.openxmlformats.org/officeDocument/2006/customXml" ds:itemID="{E8DB7DEB-074E-4EE8-9B6E-FD277323109C}">
+  <ds:schemaRefs>
+    <ds:schemaRef ds:uri="http://schemas.microsoft.com/office/2006/metadata/contentType"/>
+    <ds:schemaRef ds:uri="http://schemas.microsoft.com/office/2006/metadata/properties/metaAttributes"/>
+    <ds:schemaRef ds:uri="http://www.w3.org/2001/XMLSchema"/>
+    <ds:schemaRef ds:uri="http://schemas.microsoft.com/office/2006/metadata/properties"/>
+    <ds:schemaRef ds:uri="http://schemas.openxmlformats.org/package/2006/metadata/core-properties"/>
+    <ds:schemaRef ds:uri="http://purl.org/dc/elements/1.1/"/>
+    <ds:schemaRef ds:uri="http://purl.org/dc/terms/"/>
+    <ds:schemaRef ds:uri="http://schemas.microsoft.com/office/internal/2005/internalDocumentation"/>
+  </ds:schemaRefs>
+</ds:datastoreItem>
+</file>
+
+<file path=customXml/itemProps2.xml><?xml version="1.0" encoding="utf-8"?>
 <ds:datastoreItem xmlns:ds="http://schemas.openxmlformats.org/officeDocument/2006/customXml" ds:itemID="{A50EC660-24D0-43A0-AE5E-E274115E726B}">
   <ds:schemaRefs>
     <ds:schemaRef ds:uri="http://purl.org/dc/terms/"/>
@@ -11636,21 +11668,6 @@
 </ds:datastoreItem>
 </file>
 
-<file path=customXml/itemProps2.xml><?xml version="1.0" encoding="utf-8"?>
-<ds:datastoreItem xmlns:ds="http://schemas.openxmlformats.org/officeDocument/2006/customXml" ds:itemID="{E8DB7DEB-074E-4EE8-9B6E-FD277323109C}">
-  <ds:schemaRefs>
-    <ds:schemaRef ds:uri="http://schemas.microsoft.com/office/2006/metadata/contentType"/>
-    <ds:schemaRef ds:uri="http://schemas.microsoft.com/office/2006/metadata/properties/metaAttributes"/>
-    <ds:schemaRef ds:uri="http://www.w3.org/2001/XMLSchema"/>
-    <ds:schemaRef ds:uri="http://schemas.microsoft.com/office/2006/metadata/properties"/>
-    <ds:schemaRef ds:uri="http://schemas.openxmlformats.org/package/2006/metadata/core-properties"/>
-    <ds:schemaRef ds:uri="http://purl.org/dc/elements/1.1/"/>
-    <ds:schemaRef ds:uri="http://purl.org/dc/terms/"/>
-    <ds:schemaRef ds:uri="http://schemas.microsoft.com/office/internal/2005/internalDocumentation"/>
-  </ds:schemaRefs>
-</ds:datastoreItem>
-</file>
-
 <file path=customXml/itemProps3.xml><?xml version="1.0" encoding="utf-8"?>
 <ds:datastoreItem xmlns:ds="http://schemas.openxmlformats.org/officeDocument/2006/customXml" ds:itemID="{19E20559-B232-4371-8690-E3D8007EDB82}">
   <ds:schemaRefs>

</xml_diff>